<commit_message>
Finalizing Powerpoint of Analysis
Finalised the powerpoint covering the analysis, data visualization and measures, and provided recommendation to address sale weakpoints backed by data and reasoning.
</commit_message>
<xml_diff>
--- a/Analysis/Store Sales Analysis presentation.pptx
+++ b/Analysis/Store Sales Analysis presentation.pptx
@@ -5,7 +5,7 @@
     <p:sldMasterId id="2147483695" r:id="rId1"/>
   </p:sldMasterIdLst>
   <p:notesMasterIdLst>
-    <p:notesMasterId r:id="rId7"/>
+    <p:notesMasterId r:id="rId9"/>
   </p:notesMasterIdLst>
   <p:sldIdLst>
     <p:sldId id="256" r:id="rId2"/>
@@ -13,6 +13,8 @@
     <p:sldId id="258" r:id="rId4"/>
     <p:sldId id="259" r:id="rId5"/>
     <p:sldId id="260" r:id="rId6"/>
+    <p:sldId id="261" r:id="rId7"/>
+    <p:sldId id="262" r:id="rId8"/>
   </p:sldIdLst>
   <p:sldSz cx="12192000" cy="6858000"/>
   <p:notesSz cx="6858000" cy="9144000"/>
@@ -111,7 +113,196 @@
       </a:defRPr>
     </a:lvl9pPr>
   </p:defaultTextStyle>
+  <p:extLst>
+    <p:ext uri="{EFAFB233-063F-42B5-8137-9DF3F51BA10A}">
+      <p15:sldGuideLst xmlns:p15="http://schemas.microsoft.com/office/powerpoint/2012/main"/>
+    </p:ext>
+  </p:extLst>
 </p:presentation>
+</file>
+
+<file path=ppt/revisionInfo.xml><?xml version="1.0" encoding="utf-8"?>
+<p1510:revInfo xmlns:a="http://schemas.openxmlformats.org/drawingml/2006/main" xmlns:r="http://schemas.openxmlformats.org/officeDocument/2006/relationships" xmlns:p1510="http://schemas.microsoft.com/office/powerpoint/2015/10/main">
+  <p1510:revLst>
+    <p1510:client id="{7A49E13E-0108-4FE3-9A0E-192F8DC357B8}" v="6" dt="2025-11-07T13:31:55.979"/>
+  </p1510:revLst>
+</p1510:revInfo>
+</file>
+
+<file path=ppt/changesInfos/changesInfo1.xml><?xml version="1.0" encoding="utf-8"?>
+<pc:chgInfo xmlns:a="http://schemas.openxmlformats.org/drawingml/2006/main" xmlns:r="http://schemas.openxmlformats.org/officeDocument/2006/relationships" xmlns:ac="http://schemas.microsoft.com/office/drawing/2013/main/command" xmlns:pc="http://schemas.microsoft.com/office/powerpoint/2013/main/command">
+  <pc:docChgLst>
+    <pc:chgData name="daryl sangalang" userId="9ab3aa86f88f92f8" providerId="LiveId" clId="{E0CC8E52-537F-4E2A-ACDC-EF4501DF4EA4}"/>
+    <pc:docChg chg="undo custSel addSld delSld modSld sldOrd">
+      <pc:chgData name="daryl sangalang" userId="9ab3aa86f88f92f8" providerId="LiveId" clId="{E0CC8E52-537F-4E2A-ACDC-EF4501DF4EA4}" dt="2025-11-07T13:32:18.705" v="330" actId="1076"/>
+      <pc:docMkLst>
+        <pc:docMk/>
+      </pc:docMkLst>
+      <pc:sldChg chg="modSp mod">
+        <pc:chgData name="daryl sangalang" userId="9ab3aa86f88f92f8" providerId="LiveId" clId="{E0CC8E52-537F-4E2A-ACDC-EF4501DF4EA4}" dt="2025-11-07T12:54:51.654" v="52" actId="20577"/>
+        <pc:sldMkLst>
+          <pc:docMk/>
+          <pc:sldMk cId="1914256720" sldId="256"/>
+        </pc:sldMkLst>
+        <pc:spChg chg="mod">
+          <ac:chgData name="daryl sangalang" userId="9ab3aa86f88f92f8" providerId="LiveId" clId="{E0CC8E52-537F-4E2A-ACDC-EF4501DF4EA4}" dt="2025-11-07T12:54:51.654" v="52" actId="20577"/>
+          <ac:spMkLst>
+            <pc:docMk/>
+            <pc:sldMk cId="1914256720" sldId="256"/>
+            <ac:spMk id="2" creationId="{B8A37182-A8C9-7F88-2C93-FB60B0F9CB14}"/>
+          </ac:spMkLst>
+        </pc:spChg>
+      </pc:sldChg>
+      <pc:sldChg chg="modSp mod">
+        <pc:chgData name="daryl sangalang" userId="9ab3aa86f88f92f8" providerId="LiveId" clId="{E0CC8E52-537F-4E2A-ACDC-EF4501DF4EA4}" dt="2025-11-07T12:56:06.044" v="53" actId="20577"/>
+        <pc:sldMkLst>
+          <pc:docMk/>
+          <pc:sldMk cId="4027979730" sldId="258"/>
+        </pc:sldMkLst>
+        <pc:spChg chg="mod">
+          <ac:chgData name="daryl sangalang" userId="9ab3aa86f88f92f8" providerId="LiveId" clId="{E0CC8E52-537F-4E2A-ACDC-EF4501DF4EA4}" dt="2025-11-07T12:56:06.044" v="53" actId="20577"/>
+          <ac:spMkLst>
+            <pc:docMk/>
+            <pc:sldMk cId="4027979730" sldId="258"/>
+            <ac:spMk id="6" creationId="{93062D65-F46A-DE89-5427-BAB7912D8E64}"/>
+          </ac:spMkLst>
+        </pc:spChg>
+      </pc:sldChg>
+      <pc:sldChg chg="modSp mod">
+        <pc:chgData name="daryl sangalang" userId="9ab3aa86f88f92f8" providerId="LiveId" clId="{E0CC8E52-537F-4E2A-ACDC-EF4501DF4EA4}" dt="2025-11-07T12:59:23.387" v="264" actId="20577"/>
+        <pc:sldMkLst>
+          <pc:docMk/>
+          <pc:sldMk cId="4132582523" sldId="260"/>
+        </pc:sldMkLst>
+        <pc:spChg chg="mod">
+          <ac:chgData name="daryl sangalang" userId="9ab3aa86f88f92f8" providerId="LiveId" clId="{E0CC8E52-537F-4E2A-ACDC-EF4501DF4EA4}" dt="2025-11-07T12:59:23.387" v="264" actId="20577"/>
+          <ac:spMkLst>
+            <pc:docMk/>
+            <pc:sldMk cId="4132582523" sldId="260"/>
+            <ac:spMk id="9" creationId="{007459C4-CEE7-4851-A792-E39C104BBA7E}"/>
+          </ac:spMkLst>
+        </pc:spChg>
+      </pc:sldChg>
+      <pc:sldChg chg="addSp delSp modSp add mod ord">
+        <pc:chgData name="daryl sangalang" userId="9ab3aa86f88f92f8" providerId="LiveId" clId="{E0CC8E52-537F-4E2A-ACDC-EF4501DF4EA4}" dt="2025-11-07T13:27:27.902" v="299" actId="113"/>
+        <pc:sldMkLst>
+          <pc:docMk/>
+          <pc:sldMk cId="2475073334" sldId="261"/>
+        </pc:sldMkLst>
+        <pc:spChg chg="add del mod">
+          <ac:chgData name="daryl sangalang" userId="9ab3aa86f88f92f8" providerId="LiveId" clId="{E0CC8E52-537F-4E2A-ACDC-EF4501DF4EA4}" dt="2025-11-07T13:25:53.379" v="285"/>
+          <ac:spMkLst>
+            <pc:docMk/>
+            <pc:sldMk cId="2475073334" sldId="261"/>
+            <ac:spMk id="3" creationId="{E8295894-3DA0-B140-6135-2D64545ECA42}"/>
+          </ac:spMkLst>
+        </pc:spChg>
+        <pc:spChg chg="mod">
+          <ac:chgData name="daryl sangalang" userId="9ab3aa86f88f92f8" providerId="LiveId" clId="{E0CC8E52-537F-4E2A-ACDC-EF4501DF4EA4}" dt="2025-11-07T13:26:48.504" v="292" actId="14100"/>
+          <ac:spMkLst>
+            <pc:docMk/>
+            <pc:sldMk cId="2475073334" sldId="261"/>
+            <ac:spMk id="6" creationId="{4E485C26-72C1-4FB6-057D-D33D03522BB2}"/>
+          </ac:spMkLst>
+        </pc:spChg>
+        <pc:spChg chg="mod">
+          <ac:chgData name="daryl sangalang" userId="9ab3aa86f88f92f8" providerId="LiveId" clId="{E0CC8E52-537F-4E2A-ACDC-EF4501DF4EA4}" dt="2025-11-07T13:27:27.902" v="299" actId="113"/>
+          <ac:spMkLst>
+            <pc:docMk/>
+            <pc:sldMk cId="2475073334" sldId="261"/>
+            <ac:spMk id="7" creationId="{E118898B-6B7C-59A5-C62E-805406C248C9}"/>
+          </ac:spMkLst>
+        </pc:spChg>
+        <pc:spChg chg="mod">
+          <ac:chgData name="daryl sangalang" userId="9ab3aa86f88f92f8" providerId="LiveId" clId="{E0CC8E52-537F-4E2A-ACDC-EF4501DF4EA4}" dt="2025-11-07T13:26:04.380" v="288" actId="1076"/>
+          <ac:spMkLst>
+            <pc:docMk/>
+            <pc:sldMk cId="2475073334" sldId="261"/>
+            <ac:spMk id="11" creationId="{6D952A29-69F0-95B6-3DA3-C72D3563C915}"/>
+          </ac:spMkLst>
+        </pc:spChg>
+        <pc:picChg chg="add mod">
+          <ac:chgData name="daryl sangalang" userId="9ab3aa86f88f92f8" providerId="LiveId" clId="{E0CC8E52-537F-4E2A-ACDC-EF4501DF4EA4}" dt="2025-11-07T13:25:54.374" v="287" actId="962"/>
+          <ac:picMkLst>
+            <pc:docMk/>
+            <pc:sldMk cId="2475073334" sldId="261"/>
+            <ac:picMk id="5" creationId="{A6208013-E9EB-4F72-D448-9E84DF1A6690}"/>
+          </ac:picMkLst>
+        </pc:picChg>
+        <pc:picChg chg="del">
+          <ac:chgData name="daryl sangalang" userId="9ab3aa86f88f92f8" providerId="LiveId" clId="{E0CC8E52-537F-4E2A-ACDC-EF4501DF4EA4}" dt="2025-11-07T13:25:37.375" v="283" actId="478"/>
+          <ac:picMkLst>
+            <pc:docMk/>
+            <pc:sldMk cId="2475073334" sldId="261"/>
+            <ac:picMk id="10" creationId="{603C1514-2571-534A-8B96-A5FA96E709E2}"/>
+          </ac:picMkLst>
+        </pc:picChg>
+      </pc:sldChg>
+      <pc:sldChg chg="new del">
+        <pc:chgData name="daryl sangalang" userId="9ab3aa86f88f92f8" providerId="LiveId" clId="{E0CC8E52-537F-4E2A-ACDC-EF4501DF4EA4}" dt="2025-11-07T12:58:46.897" v="131" actId="680"/>
+        <pc:sldMkLst>
+          <pc:docMk/>
+          <pc:sldMk cId="2675769534" sldId="261"/>
+        </pc:sldMkLst>
+      </pc:sldChg>
+      <pc:sldChg chg="addSp delSp modSp add mod">
+        <pc:chgData name="daryl sangalang" userId="9ab3aa86f88f92f8" providerId="LiveId" clId="{E0CC8E52-537F-4E2A-ACDC-EF4501DF4EA4}" dt="2025-11-07T13:32:18.705" v="330" actId="1076"/>
+        <pc:sldMkLst>
+          <pc:docMk/>
+          <pc:sldMk cId="1070654015" sldId="262"/>
+        </pc:sldMkLst>
+        <pc:spChg chg="add del mod">
+          <ac:chgData name="daryl sangalang" userId="9ab3aa86f88f92f8" providerId="LiveId" clId="{E0CC8E52-537F-4E2A-ACDC-EF4501DF4EA4}" dt="2025-11-07T13:31:24.718" v="316"/>
+          <ac:spMkLst>
+            <pc:docMk/>
+            <pc:sldMk cId="1070654015" sldId="262"/>
+            <ac:spMk id="3" creationId="{1E4D3E06-AB28-FD4A-6C89-1A9D1D1402C2}"/>
+          </ac:spMkLst>
+        </pc:spChg>
+        <pc:spChg chg="mod">
+          <ac:chgData name="daryl sangalang" userId="9ab3aa86f88f92f8" providerId="LiveId" clId="{E0CC8E52-537F-4E2A-ACDC-EF4501DF4EA4}" dt="2025-11-07T13:32:18.705" v="330" actId="1076"/>
+          <ac:spMkLst>
+            <pc:docMk/>
+            <pc:sldMk cId="1070654015" sldId="262"/>
+            <ac:spMk id="6" creationId="{F86A2AE6-40DB-A525-9460-90D36CB180AE}"/>
+          </ac:spMkLst>
+        </pc:spChg>
+        <pc:spChg chg="mod">
+          <ac:chgData name="daryl sangalang" userId="9ab3aa86f88f92f8" providerId="LiveId" clId="{E0CC8E52-537F-4E2A-ACDC-EF4501DF4EA4}" dt="2025-11-07T13:32:15.457" v="329" actId="1076"/>
+          <ac:spMkLst>
+            <pc:docMk/>
+            <pc:sldMk cId="1070654015" sldId="262"/>
+            <ac:spMk id="7" creationId="{3F75DE84-B11D-21E7-9781-A67A40B152DC}"/>
+          </ac:spMkLst>
+        </pc:spChg>
+        <pc:spChg chg="mod">
+          <ac:chgData name="daryl sangalang" userId="9ab3aa86f88f92f8" providerId="LiveId" clId="{E0CC8E52-537F-4E2A-ACDC-EF4501DF4EA4}" dt="2025-11-07T13:31:01.717" v="313" actId="27636"/>
+          <ac:spMkLst>
+            <pc:docMk/>
+            <pc:sldMk cId="1070654015" sldId="262"/>
+            <ac:spMk id="11" creationId="{5DB4CDEC-B2E5-91F9-3B6F-43F61269A74D}"/>
+          </ac:spMkLst>
+        </pc:spChg>
+        <pc:picChg chg="del">
+          <ac:chgData name="daryl sangalang" userId="9ab3aa86f88f92f8" providerId="LiveId" clId="{E0CC8E52-537F-4E2A-ACDC-EF4501DF4EA4}" dt="2025-11-07T13:31:12.789" v="314" actId="478"/>
+          <ac:picMkLst>
+            <pc:docMk/>
+            <pc:sldMk cId="1070654015" sldId="262"/>
+            <ac:picMk id="5" creationId="{FA10F4C5-9D82-23D4-B862-F5396E0F9211}"/>
+          </ac:picMkLst>
+        </pc:picChg>
+        <pc:picChg chg="add mod">
+          <ac:chgData name="daryl sangalang" userId="9ab3aa86f88f92f8" providerId="LiveId" clId="{E0CC8E52-537F-4E2A-ACDC-EF4501DF4EA4}" dt="2025-11-07T13:31:25.707" v="318" actId="962"/>
+          <ac:picMkLst>
+            <pc:docMk/>
+            <pc:sldMk cId="1070654015" sldId="262"/>
+            <ac:picMk id="8" creationId="{6EE73519-D175-E6CA-E4E1-47E7255F2860}"/>
+          </ac:picMkLst>
+        </pc:picChg>
+      </pc:sldChg>
+    </pc:docChg>
+  </pc:docChgLst>
+</pc:chgInfo>
 </file>
 
 <file path=ppt/notesMasters/notesMaster1.xml><?xml version="1.0" encoding="utf-8"?>
@@ -758,6 +949,13 @@
             <a:noFill/>
           </a:ln>
         </p:spPr>
+        <p:txBody>
+          <a:bodyPr/>
+          <a:lstStyle/>
+          <a:p>
+            <a:endParaRPr lang="en-AU"/>
+          </a:p>
+        </p:txBody>
       </p:sp>
       <p:sp>
         <p:nvSpPr>
@@ -3330,6 +3528,13 @@
             <a:noFill/>
           </a:ln>
         </p:spPr>
+        <p:txBody>
+          <a:bodyPr/>
+          <a:lstStyle/>
+          <a:p>
+            <a:endParaRPr lang="en-AU"/>
+          </a:p>
+        </p:txBody>
       </p:sp>
       <p:sp>
         <p:nvSpPr>
@@ -5637,6 +5842,13 @@
               <a:noFill/>
             </a:ln>
           </p:spPr>
+          <p:txBody>
+            <a:bodyPr/>
+            <a:lstStyle/>
+            <a:p>
+              <a:endParaRPr lang="en-AU"/>
+            </a:p>
+          </p:txBody>
         </p:sp>
         <p:sp>
           <p:nvSpPr>
@@ -5703,6 +5915,13 @@
               <a:noFill/>
             </a:ln>
           </p:spPr>
+          <p:txBody>
+            <a:bodyPr/>
+            <a:lstStyle/>
+            <a:p>
+              <a:endParaRPr lang="en-AU"/>
+            </a:p>
+          </p:txBody>
         </p:sp>
         <p:sp>
           <p:nvSpPr>
@@ -5774,6 +5993,13 @@
               <a:noFill/>
             </a:ln>
           </p:spPr>
+          <p:txBody>
+            <a:bodyPr/>
+            <a:lstStyle/>
+            <a:p>
+              <a:endParaRPr lang="en-AU"/>
+            </a:p>
+          </p:txBody>
         </p:sp>
         <p:sp>
           <p:nvSpPr>
@@ -5825,6 +6051,13 @@
               <a:noFill/>
             </a:ln>
           </p:spPr>
+          <p:txBody>
+            <a:bodyPr/>
+            <a:lstStyle/>
+            <a:p>
+              <a:endParaRPr lang="en-AU"/>
+            </a:p>
+          </p:txBody>
         </p:sp>
         <p:sp>
           <p:nvSpPr>
@@ -5911,6 +6144,13 @@
               <a:noFill/>
             </a:ln>
           </p:spPr>
+          <p:txBody>
+            <a:bodyPr/>
+            <a:lstStyle/>
+            <a:p>
+              <a:endParaRPr lang="en-AU"/>
+            </a:p>
+          </p:txBody>
         </p:sp>
         <p:sp>
           <p:nvSpPr>
@@ -5992,6 +6232,13 @@
               <a:noFill/>
             </a:ln>
           </p:spPr>
+          <p:txBody>
+            <a:bodyPr/>
+            <a:lstStyle/>
+            <a:p>
+              <a:endParaRPr lang="en-AU"/>
+            </a:p>
+          </p:txBody>
         </p:sp>
         <p:sp>
           <p:nvSpPr>
@@ -6053,6 +6300,13 @@
               <a:noFill/>
             </a:ln>
           </p:spPr>
+          <p:txBody>
+            <a:bodyPr/>
+            <a:lstStyle/>
+            <a:p>
+              <a:endParaRPr lang="en-AU"/>
+            </a:p>
+          </p:txBody>
         </p:sp>
         <p:sp>
           <p:nvSpPr>
@@ -6134,6 +6388,13 @@
               <a:noFill/>
             </a:ln>
           </p:spPr>
+          <p:txBody>
+            <a:bodyPr/>
+            <a:lstStyle/>
+            <a:p>
+              <a:endParaRPr lang="en-AU"/>
+            </a:p>
+          </p:txBody>
         </p:sp>
         <p:sp>
           <p:nvSpPr>
@@ -6250,6 +6511,13 @@
               <a:noFill/>
             </a:ln>
           </p:spPr>
+          <p:txBody>
+            <a:bodyPr/>
+            <a:lstStyle/>
+            <a:p>
+              <a:endParaRPr lang="en-AU"/>
+            </a:p>
+          </p:txBody>
         </p:sp>
         <p:sp>
           <p:nvSpPr>
@@ -6301,6 +6569,13 @@
               <a:noFill/>
             </a:ln>
           </p:spPr>
+          <p:txBody>
+            <a:bodyPr/>
+            <a:lstStyle/>
+            <a:p>
+              <a:endParaRPr lang="en-AU"/>
+            </a:p>
+          </p:txBody>
         </p:sp>
         <p:sp>
           <p:nvSpPr>
@@ -6362,6 +6637,13 @@
               <a:noFill/>
             </a:ln>
           </p:spPr>
+          <p:txBody>
+            <a:bodyPr/>
+            <a:lstStyle/>
+            <a:p>
+              <a:endParaRPr lang="en-AU"/>
+            </a:p>
+          </p:txBody>
         </p:sp>
         <p:sp>
           <p:nvSpPr>
@@ -6433,6 +6715,13 @@
               <a:noFill/>
             </a:ln>
           </p:spPr>
+          <p:txBody>
+            <a:bodyPr/>
+            <a:lstStyle/>
+            <a:p>
+              <a:endParaRPr lang="en-AU"/>
+            </a:p>
+          </p:txBody>
         </p:sp>
       </p:grpSp>
       <p:grpSp>
@@ -6552,6 +6841,13 @@
               <a:noFill/>
             </a:ln>
           </p:spPr>
+          <p:txBody>
+            <a:bodyPr/>
+            <a:lstStyle/>
+            <a:p>
+              <a:endParaRPr lang="en-AU"/>
+            </a:p>
+          </p:txBody>
         </p:sp>
         <p:sp>
           <p:nvSpPr>
@@ -6621,6 +6917,13 @@
               <a:noFill/>
             </a:ln>
           </p:spPr>
+          <p:txBody>
+            <a:bodyPr/>
+            <a:lstStyle/>
+            <a:p>
+              <a:endParaRPr lang="en-AU"/>
+            </a:p>
+          </p:txBody>
         </p:sp>
         <p:sp>
           <p:nvSpPr>
@@ -6690,6 +6993,13 @@
               <a:noFill/>
             </a:ln>
           </p:spPr>
+          <p:txBody>
+            <a:bodyPr/>
+            <a:lstStyle/>
+            <a:p>
+              <a:endParaRPr lang="en-AU"/>
+            </a:p>
+          </p:txBody>
         </p:sp>
         <p:sp>
           <p:nvSpPr>
@@ -6774,6 +7084,13 @@
               <a:noFill/>
             </a:ln>
           </p:spPr>
+          <p:txBody>
+            <a:bodyPr/>
+            <a:lstStyle/>
+            <a:p>
+              <a:endParaRPr lang="en-AU"/>
+            </a:p>
+          </p:txBody>
         </p:sp>
         <p:sp>
           <p:nvSpPr>
@@ -6868,6 +7185,13 @@
               <a:noFill/>
             </a:ln>
           </p:spPr>
+          <p:txBody>
+            <a:bodyPr/>
+            <a:lstStyle/>
+            <a:p>
+              <a:endParaRPr lang="en-AU"/>
+            </a:p>
+          </p:txBody>
         </p:sp>
         <p:sp>
           <p:nvSpPr>
@@ -6917,6 +7241,13 @@
               <a:noFill/>
             </a:ln>
           </p:spPr>
+          <p:txBody>
+            <a:bodyPr/>
+            <a:lstStyle/>
+            <a:p>
+              <a:endParaRPr lang="en-AU"/>
+            </a:p>
+          </p:txBody>
         </p:sp>
         <p:sp>
           <p:nvSpPr>
@@ -6981,6 +7312,13 @@
               <a:noFill/>
             </a:ln>
           </p:spPr>
+          <p:txBody>
+            <a:bodyPr/>
+            <a:lstStyle/>
+            <a:p>
+              <a:endParaRPr lang="en-AU"/>
+            </a:p>
+          </p:txBody>
         </p:sp>
         <p:sp>
           <p:nvSpPr>
@@ -7090,6 +7428,13 @@
               <a:noFill/>
             </a:ln>
           </p:spPr>
+          <p:txBody>
+            <a:bodyPr/>
+            <a:lstStyle/>
+            <a:p>
+              <a:endParaRPr lang="en-AU"/>
+            </a:p>
+          </p:txBody>
         </p:sp>
         <p:sp>
           <p:nvSpPr>
@@ -7139,6 +7484,13 @@
               <a:noFill/>
             </a:ln>
           </p:spPr>
+          <p:txBody>
+            <a:bodyPr/>
+            <a:lstStyle/>
+            <a:p>
+              <a:endParaRPr lang="en-AU"/>
+            </a:p>
+          </p:txBody>
         </p:sp>
         <p:sp>
           <p:nvSpPr>
@@ -7208,6 +7560,13 @@
               <a:noFill/>
             </a:ln>
           </p:spPr>
+          <p:txBody>
+            <a:bodyPr/>
+            <a:lstStyle/>
+            <a:p>
+              <a:endParaRPr lang="en-AU"/>
+            </a:p>
+          </p:txBody>
         </p:sp>
         <p:sp>
           <p:nvSpPr>
@@ -7272,6 +7631,13 @@
               <a:noFill/>
             </a:ln>
           </p:spPr>
+          <p:txBody>
+            <a:bodyPr/>
+            <a:lstStyle/>
+            <a:p>
+              <a:endParaRPr lang="en-AU"/>
+            </a:p>
+          </p:txBody>
         </p:sp>
         <p:sp>
           <p:nvSpPr>
@@ -7341,6 +7707,13 @@
               <a:noFill/>
             </a:ln>
           </p:spPr>
+          <p:txBody>
+            <a:bodyPr/>
+            <a:lstStyle/>
+            <a:p>
+              <a:endParaRPr lang="en-AU"/>
+            </a:p>
+          </p:txBody>
         </p:sp>
       </p:grpSp>
       <p:sp>
@@ -7379,6 +7752,13 @@
             <a:schemeClr val="lt1"/>
           </a:fontRef>
         </p:style>
+        <p:txBody>
+          <a:bodyPr/>
+          <a:lstStyle/>
+          <a:p>
+            <a:endParaRPr lang="en-AU"/>
+          </a:p>
+        </p:txBody>
       </p:sp>
       <p:sp>
         <p:nvSpPr>
@@ -8051,7 +8431,7 @@
           <a:p>
             <a:r>
               <a:rPr lang="en-US" dirty="0"/>
-              <a:t>DS Megastore</a:t>
+              <a:t>Store Sales Analysis</a:t>
             </a:r>
             <a:endParaRPr lang="en-AU" dirty="0"/>
           </a:p>
@@ -8430,7 +8810,7 @@
           <a:p>
             <a:r>
               <a:rPr lang="en-US" sz="1400" dirty="0"/>
-              <a:t>The Month of January showing strongest revenue return seeing a revenue of ~476k.</a:t>
+              <a:t>The Month of January showing strongest revenue return of ~476k.</a:t>
             </a:r>
           </a:p>
           <a:p>
@@ -8868,7 +9248,7 @@
         <p:spPr>
           <a:xfrm>
             <a:off x="1638300" y="2053532"/>
-            <a:ext cx="8915400" cy="2009061"/>
+            <a:ext cx="8915400" cy="2485787"/>
           </a:xfrm>
           <a:prstGeom prst="roundRect">
             <a:avLst/>
@@ -8888,7 +9268,7 @@
           <a:p>
             <a:r>
               <a:rPr lang="en-US" sz="1400" dirty="0"/>
-              <a:t>Looking at the 4 best and worst months of revenue, we can see that our most reliable commodities are: </a:t>
+              <a:t>Looking at the 4 best and worst months of revenue, we can see that our most reliable product categories are: </a:t>
             </a:r>
           </a:p>
           <a:p>
@@ -8941,6 +9321,20 @@
             <a:r>
               <a:rPr lang="en-US" sz="1400" b="1" dirty="0"/>
               <a:t>South</a:t>
+            </a:r>
+            <a:r>
+              <a:rPr lang="en-US" sz="1400" dirty="0"/>
+              <a:t>.</a:t>
+            </a:r>
+            <a:br>
+              <a:rPr lang="en-US" sz="1400" dirty="0"/>
+            </a:br>
+            <a:br>
+              <a:rPr lang="en-US" sz="1400" dirty="0"/>
+            </a:br>
+            <a:r>
+              <a:rPr lang="en-US" sz="1400" dirty="0"/>
+              <a:t>These variables will be our improvement focus.</a:t>
             </a:r>
             <a:br>
               <a:rPr lang="en-US" sz="1400" dirty="0"/>
@@ -9022,6 +9416,429 @@
     <p:extLst>
       <p:ext uri="{BB962C8B-B14F-4D97-AF65-F5344CB8AC3E}">
         <p14:creationId xmlns:p14="http://schemas.microsoft.com/office/powerpoint/2010/main" val="4132582523"/>
+      </p:ext>
+    </p:extLst>
+  </p:cSld>
+  <p:clrMapOvr>
+    <a:masterClrMapping/>
+  </p:clrMapOvr>
+</p:sld>
+</file>
+
+<file path=ppt/slides/slide6.xml><?xml version="1.0" encoding="utf-8"?>
+<p:sld xmlns:a="http://schemas.openxmlformats.org/drawingml/2006/main" xmlns:r="http://schemas.openxmlformats.org/officeDocument/2006/relationships" xmlns:p="http://schemas.openxmlformats.org/presentationml/2006/main">
+  <p:cSld>
+    <p:spTree>
+      <p:nvGrpSpPr>
+        <p:cNvPr id="1" name="">
+          <a:extLst>
+            <a:ext uri="{FF2B5EF4-FFF2-40B4-BE49-F238E27FC236}">
+              <a16:creationId xmlns:a16="http://schemas.microsoft.com/office/drawing/2014/main" id="{9091CD40-FC18-A396-5F2E-D5608C622BF9}"/>
+            </a:ext>
+          </a:extLst>
+        </p:cNvPr>
+        <p:cNvGrpSpPr/>
+        <p:nvPr/>
+      </p:nvGrpSpPr>
+      <p:grpSpPr>
+        <a:xfrm>
+          <a:off x="0" y="0"/>
+          <a:ext cx="0" cy="0"/>
+          <a:chOff x="0" y="0"/>
+          <a:chExt cx="0" cy="0"/>
+        </a:xfrm>
+      </p:grpSpPr>
+      <p:sp>
+        <p:nvSpPr>
+          <p:cNvPr id="6" name="TextBox 5">
+            <a:extLst>
+              <a:ext uri="{FF2B5EF4-FFF2-40B4-BE49-F238E27FC236}">
+                <a16:creationId xmlns:a16="http://schemas.microsoft.com/office/drawing/2014/main" id="{4E485C26-72C1-4FB6-057D-D33D03522BB2}"/>
+              </a:ext>
+            </a:extLst>
+          </p:cNvPr>
+          <p:cNvSpPr txBox="1"/>
+          <p:nvPr/>
+        </p:nvSpPr>
+        <p:spPr>
+          <a:xfrm>
+            <a:off x="1799802" y="4328599"/>
+            <a:ext cx="8915400" cy="578882"/>
+          </a:xfrm>
+          <a:prstGeom prst="roundRect">
+            <a:avLst/>
+          </a:prstGeom>
+          <a:solidFill>
+            <a:schemeClr val="accent4">
+              <a:lumMod val="40000"/>
+              <a:lumOff val="60000"/>
+            </a:schemeClr>
+          </a:solidFill>
+        </p:spPr>
+        <p:txBody>
+          <a:bodyPr wrap="square" rtlCol="0">
+            <a:spAutoFit/>
+          </a:bodyPr>
+          <a:lstStyle/>
+          <a:p>
+            <a:r>
+              <a:rPr lang="en-US" sz="1400" dirty="0"/>
+              <a:t>As we can see, there's a lull period in revenue for the period April to July with a noticeable dip in returning customer purchases.</a:t>
+            </a:r>
+          </a:p>
+        </p:txBody>
+      </p:sp>
+      <p:sp>
+        <p:nvSpPr>
+          <p:cNvPr id="7" name="TextBox 6">
+            <a:extLst>
+              <a:ext uri="{FF2B5EF4-FFF2-40B4-BE49-F238E27FC236}">
+                <a16:creationId xmlns:a16="http://schemas.microsoft.com/office/drawing/2014/main" id="{E118898B-6B7C-59A5-C62E-805406C248C9}"/>
+              </a:ext>
+            </a:extLst>
+          </p:cNvPr>
+          <p:cNvSpPr txBox="1"/>
+          <p:nvPr/>
+        </p:nvSpPr>
+        <p:spPr>
+          <a:xfrm>
+            <a:off x="1799801" y="5073411"/>
+            <a:ext cx="8915399" cy="1532334"/>
+          </a:xfrm>
+          <a:prstGeom prst="roundRect">
+            <a:avLst/>
+          </a:prstGeom>
+          <a:solidFill>
+            <a:schemeClr val="accent4">
+              <a:lumMod val="40000"/>
+              <a:lumOff val="60000"/>
+            </a:schemeClr>
+          </a:solidFill>
+        </p:spPr>
+        <p:txBody>
+          <a:bodyPr wrap="square" rtlCol="0">
+            <a:spAutoFit/>
+          </a:bodyPr>
+          <a:lstStyle/>
+          <a:p>
+            <a:r>
+              <a:rPr lang="en-US" sz="1400" u="sng" dirty="0"/>
+              <a:t>Suggestion:</a:t>
+            </a:r>
+            <a:r>
+              <a:rPr lang="en-US" sz="1400" dirty="0"/>
+              <a:t> To address this lull for April - July period for our </a:t>
+            </a:r>
+            <a:r>
+              <a:rPr lang="en-US" sz="1400" b="1" dirty="0"/>
+              <a:t>SOUTH</a:t>
+            </a:r>
+            <a:r>
+              <a:rPr lang="en-US" sz="1400" dirty="0"/>
+              <a:t> and </a:t>
+            </a:r>
+            <a:r>
+              <a:rPr lang="en-US" sz="1400" b="1" dirty="0"/>
+              <a:t>WEST</a:t>
+            </a:r>
+            <a:r>
+              <a:rPr lang="en-US" sz="1400" dirty="0"/>
+              <a:t> stores' returning customers, we can explore the option of introducing a limited time, in-store only 'Loyalty' offer (To be assessed by Marketing team) for our Clothing products.</a:t>
+            </a:r>
+          </a:p>
+          <a:p>
+            <a:br>
+              <a:rPr lang="en-US" sz="1400" dirty="0"/>
+            </a:br>
+            <a:r>
+              <a:rPr lang="en-US" sz="1400" dirty="0"/>
+              <a:t>This should not only bolster the sales for our returning customers but will have an added effect of incentivizing new customers to join our Loyalty program.</a:t>
+            </a:r>
+          </a:p>
+        </p:txBody>
+      </p:sp>
+      <p:sp>
+        <p:nvSpPr>
+          <p:cNvPr id="11" name="Title 1">
+            <a:extLst>
+              <a:ext uri="{FF2B5EF4-FFF2-40B4-BE49-F238E27FC236}">
+                <a16:creationId xmlns:a16="http://schemas.microsoft.com/office/drawing/2014/main" id="{6D952A29-69F0-95B6-3DA3-C72D3563C915}"/>
+              </a:ext>
+            </a:extLst>
+          </p:cNvPr>
+          <p:cNvSpPr>
+            <a:spLocks noGrp="1"/>
+          </p:cNvSpPr>
+          <p:nvPr>
+            <p:ph type="title"/>
+          </p:nvPr>
+        </p:nvSpPr>
+        <p:spPr>
+          <a:xfrm>
+            <a:off x="5320165" y="51181"/>
+            <a:ext cx="1551670" cy="551826"/>
+          </a:xfrm>
+        </p:spPr>
+        <p:txBody>
+          <a:bodyPr>
+            <a:normAutofit/>
+          </a:bodyPr>
+          <a:lstStyle/>
+          <a:p>
+            <a:r>
+              <a:rPr lang="en-US" sz="2500" dirty="0"/>
+              <a:t>Clothing</a:t>
+            </a:r>
+            <a:endParaRPr lang="en-AU" sz="2500" dirty="0"/>
+          </a:p>
+        </p:txBody>
+      </p:sp>
+      <p:pic>
+        <p:nvPicPr>
+          <p:cNvPr id="5" name="Content Placeholder 4" descr="A screenshot of a computer&#10;&#10;AI-generated content may be incorrect.">
+            <a:extLst>
+              <a:ext uri="{FF2B5EF4-FFF2-40B4-BE49-F238E27FC236}">
+                <a16:creationId xmlns:a16="http://schemas.microsoft.com/office/drawing/2014/main" id="{A6208013-E9EB-4F72-D448-9E84DF1A6690}"/>
+              </a:ext>
+            </a:extLst>
+          </p:cNvPr>
+          <p:cNvPicPr>
+            <a:picLocks noGrp="1" noChangeAspect="1"/>
+          </p:cNvPicPr>
+          <p:nvPr>
+            <p:ph idx="1"/>
+          </p:nvPr>
+        </p:nvPicPr>
+        <p:blipFill>
+          <a:blip r:embed="rId2">
+            <a:extLst>
+              <a:ext uri="{28A0092B-C50C-407E-A947-70E740481C1C}">
+                <a14:useLocalDpi xmlns:a14="http://schemas.microsoft.com/office/drawing/2010/main" val="0"/>
+              </a:ext>
+            </a:extLst>
+          </a:blip>
+          <a:stretch>
+            <a:fillRect/>
+          </a:stretch>
+        </p:blipFill>
+        <p:spPr>
+          <a:xfrm>
+            <a:off x="1800225" y="603007"/>
+            <a:ext cx="8915400" cy="3559662"/>
+          </a:xfrm>
+        </p:spPr>
+      </p:pic>
+    </p:spTree>
+    <p:extLst>
+      <p:ext uri="{BB962C8B-B14F-4D97-AF65-F5344CB8AC3E}">
+        <p14:creationId xmlns:p14="http://schemas.microsoft.com/office/powerpoint/2010/main" val="2475073334"/>
+      </p:ext>
+    </p:extLst>
+  </p:cSld>
+  <p:clrMapOvr>
+    <a:masterClrMapping/>
+  </p:clrMapOvr>
+</p:sld>
+</file>
+
+<file path=ppt/slides/slide7.xml><?xml version="1.0" encoding="utf-8"?>
+<p:sld xmlns:a="http://schemas.openxmlformats.org/drawingml/2006/main" xmlns:r="http://schemas.openxmlformats.org/officeDocument/2006/relationships" xmlns:p="http://schemas.openxmlformats.org/presentationml/2006/main">
+  <p:cSld>
+    <p:spTree>
+      <p:nvGrpSpPr>
+        <p:cNvPr id="1" name="">
+          <a:extLst>
+            <a:ext uri="{FF2B5EF4-FFF2-40B4-BE49-F238E27FC236}">
+              <a16:creationId xmlns:a16="http://schemas.microsoft.com/office/drawing/2014/main" id="{37130F53-B632-AB57-CBC0-ACF88ADC3D10}"/>
+            </a:ext>
+          </a:extLst>
+        </p:cNvPr>
+        <p:cNvGrpSpPr/>
+        <p:nvPr/>
+      </p:nvGrpSpPr>
+      <p:grpSpPr>
+        <a:xfrm>
+          <a:off x="0" y="0"/>
+          <a:ext cx="0" cy="0"/>
+          <a:chOff x="0" y="0"/>
+          <a:chExt cx="0" cy="0"/>
+        </a:xfrm>
+      </p:grpSpPr>
+      <p:sp>
+        <p:nvSpPr>
+          <p:cNvPr id="6" name="TextBox 5">
+            <a:extLst>
+              <a:ext uri="{FF2B5EF4-FFF2-40B4-BE49-F238E27FC236}">
+                <a16:creationId xmlns:a16="http://schemas.microsoft.com/office/drawing/2014/main" id="{F86A2AE6-40DB-A525-9460-90D36CB180AE}"/>
+              </a:ext>
+            </a:extLst>
+          </p:cNvPr>
+          <p:cNvSpPr txBox="1"/>
+          <p:nvPr/>
+        </p:nvSpPr>
+        <p:spPr>
+          <a:xfrm>
+            <a:off x="1799801" y="4157778"/>
+            <a:ext cx="8915400" cy="578882"/>
+          </a:xfrm>
+          <a:prstGeom prst="roundRect">
+            <a:avLst/>
+          </a:prstGeom>
+          <a:solidFill>
+            <a:schemeClr val="accent4">
+              <a:lumMod val="40000"/>
+              <a:lumOff val="60000"/>
+            </a:schemeClr>
+          </a:solidFill>
+        </p:spPr>
+        <p:txBody>
+          <a:bodyPr wrap="square" rtlCol="0">
+            <a:spAutoFit/>
+          </a:bodyPr>
+          <a:lstStyle/>
+          <a:p>
+            <a:r>
+              <a:rPr lang="en-US" sz="1400" dirty="0"/>
+              <a:t>While furniture purchases by returning customers is steady, there’s a noticeable dip in revenue from new customers for May and a downward slope starting from June through to August.</a:t>
+            </a:r>
+          </a:p>
+        </p:txBody>
+      </p:sp>
+      <p:sp>
+        <p:nvSpPr>
+          <p:cNvPr id="7" name="TextBox 6">
+            <a:extLst>
+              <a:ext uri="{FF2B5EF4-FFF2-40B4-BE49-F238E27FC236}">
+                <a16:creationId xmlns:a16="http://schemas.microsoft.com/office/drawing/2014/main" id="{3F75DE84-B11D-21E7-9781-A67A40B152DC}"/>
+              </a:ext>
+            </a:extLst>
+          </p:cNvPr>
+          <p:cNvSpPr txBox="1"/>
+          <p:nvPr/>
+        </p:nvSpPr>
+        <p:spPr>
+          <a:xfrm>
+            <a:off x="1799801" y="4797758"/>
+            <a:ext cx="8915399" cy="2009061"/>
+          </a:xfrm>
+          <a:prstGeom prst="roundRect">
+            <a:avLst/>
+          </a:prstGeom>
+          <a:solidFill>
+            <a:schemeClr val="accent4">
+              <a:lumMod val="40000"/>
+              <a:lumOff val="60000"/>
+            </a:schemeClr>
+          </a:solidFill>
+        </p:spPr>
+        <p:txBody>
+          <a:bodyPr wrap="square" rtlCol="0">
+            <a:spAutoFit/>
+          </a:bodyPr>
+          <a:lstStyle/>
+          <a:p>
+            <a:r>
+              <a:rPr lang="en-US" sz="1400" u="sng" dirty="0"/>
+              <a:t>Suggestion: </a:t>
+            </a:r>
+            <a:r>
+              <a:rPr lang="en-US" sz="1400" dirty="0"/>
+              <a:t>We can explore the option of running a limited time, signup offer for new customers for these quiet periods (May, June - August).</a:t>
+            </a:r>
+          </a:p>
+          <a:p>
+            <a:r>
+              <a:rPr lang="en-US" sz="1400" dirty="0"/>
+              <a:t>We can also pair this with a SOUTH &amp; WEST location-specific, instore only promotions for certain pieces during this period.</a:t>
+            </a:r>
+            <a:br>
+              <a:rPr lang="en-US" sz="1400" dirty="0"/>
+            </a:br>
+            <a:br>
+              <a:rPr lang="en-US" sz="1400" dirty="0"/>
+            </a:br>
+            <a:r>
+              <a:rPr lang="en-US" sz="1400" dirty="0"/>
+              <a:t>This will not only increase incentive for new customers to sign up to our loyalty program but will also provide the chance for our in-store representatives to direct attention to our other pieces and/or up-sell the customers while at the same time increasing exposure to those locations.</a:t>
+            </a:r>
+          </a:p>
+        </p:txBody>
+      </p:sp>
+      <p:sp>
+        <p:nvSpPr>
+          <p:cNvPr id="11" name="Title 1">
+            <a:extLst>
+              <a:ext uri="{FF2B5EF4-FFF2-40B4-BE49-F238E27FC236}">
+                <a16:creationId xmlns:a16="http://schemas.microsoft.com/office/drawing/2014/main" id="{5DB4CDEC-B2E5-91F9-3B6F-43F61269A74D}"/>
+              </a:ext>
+            </a:extLst>
+          </p:cNvPr>
+          <p:cNvSpPr>
+            <a:spLocks noGrp="1"/>
+          </p:cNvSpPr>
+          <p:nvPr>
+            <p:ph type="title"/>
+          </p:nvPr>
+        </p:nvSpPr>
+        <p:spPr>
+          <a:xfrm>
+            <a:off x="5320165" y="51181"/>
+            <a:ext cx="1551670" cy="551826"/>
+          </a:xfrm>
+        </p:spPr>
+        <p:txBody>
+          <a:bodyPr>
+            <a:normAutofit/>
+          </a:bodyPr>
+          <a:lstStyle/>
+          <a:p>
+            <a:r>
+              <a:rPr lang="en-US" sz="2500" dirty="0"/>
+              <a:t>Furniture</a:t>
+            </a:r>
+            <a:endParaRPr lang="en-AU" sz="2500" dirty="0"/>
+          </a:p>
+        </p:txBody>
+      </p:sp>
+      <p:pic>
+        <p:nvPicPr>
+          <p:cNvPr id="8" name="Content Placeholder 7" descr="A screenshot of a computer&#10;&#10;AI-generated content may be incorrect.">
+            <a:extLst>
+              <a:ext uri="{FF2B5EF4-FFF2-40B4-BE49-F238E27FC236}">
+                <a16:creationId xmlns:a16="http://schemas.microsoft.com/office/drawing/2014/main" id="{6EE73519-D175-E6CA-E4E1-47E7255F2860}"/>
+              </a:ext>
+            </a:extLst>
+          </p:cNvPr>
+          <p:cNvPicPr>
+            <a:picLocks noGrp="1" noChangeAspect="1"/>
+          </p:cNvPicPr>
+          <p:nvPr>
+            <p:ph idx="1"/>
+          </p:nvPr>
+        </p:nvPicPr>
+        <p:blipFill>
+          <a:blip r:embed="rId2">
+            <a:extLst>
+              <a:ext uri="{28A0092B-C50C-407E-A947-70E740481C1C}">
+                <a14:useLocalDpi xmlns:a14="http://schemas.microsoft.com/office/drawing/2010/main" val="0"/>
+              </a:ext>
+            </a:extLst>
+          </a:blip>
+          <a:stretch>
+            <a:fillRect/>
+          </a:stretch>
+        </p:blipFill>
+        <p:spPr>
+          <a:xfrm>
+            <a:off x="1800225" y="616607"/>
+            <a:ext cx="8915400" cy="3480073"/>
+          </a:xfrm>
+        </p:spPr>
+      </p:pic>
+    </p:spTree>
+    <p:extLst>
+      <p:ext uri="{BB962C8B-B14F-4D97-AF65-F5344CB8AC3E}">
+        <p14:creationId xmlns:p14="http://schemas.microsoft.com/office/powerpoint/2010/main" val="1070654015"/>
       </p:ext>
     </p:extLst>
   </p:cSld>

</xml_diff>